<commit_message>
Correct documents' false-negatives metric
</commit_message>
<xml_diff>
--- a/Documents/Telecom Customer Churn Presentation.pptx
+++ b/Documents/Telecom Customer Churn Presentation.pptx
@@ -273,7 +273,7 @@
           <a:p>
             <a:fld id="{ED291B17-9318-49DB-B28B-6E5994AE9581}" type="datetime1">
               <a:rPr lang="en-US" smtClean="0"/>
-              <a:t>11/15/2021</a:t>
+              <a:t>11/16/2021</a:t>
             </a:fld>
             <a:endParaRPr lang="en-US" dirty="0"/>
           </a:p>
@@ -471,7 +471,7 @@
           <a:p>
             <a:fld id="{2CED4963-E985-44C4-B8C4-FDD613B7C2F8}" type="datetime1">
               <a:rPr lang="en-US" smtClean="0"/>
-              <a:t>11/15/2021</a:t>
+              <a:t>11/16/2021</a:t>
             </a:fld>
             <a:endParaRPr lang="en-US" dirty="0"/>
           </a:p>
@@ -679,7 +679,7 @@
           <a:p>
             <a:fld id="{ED291B17-9318-49DB-B28B-6E5994AE9581}" type="datetime1">
               <a:rPr lang="en-US" smtClean="0"/>
-              <a:t>11/15/2021</a:t>
+              <a:t>11/16/2021</a:t>
             </a:fld>
             <a:endParaRPr lang="en-US" dirty="0"/>
           </a:p>
@@ -877,7 +877,7 @@
           <a:p>
             <a:fld id="{78DD82B9-B8EE-4375-B6FF-88FA6ABB15D9}" type="datetime1">
               <a:rPr lang="en-US" smtClean="0"/>
-              <a:t>11/15/2021</a:t>
+              <a:t>11/16/2021</a:t>
             </a:fld>
             <a:endParaRPr lang="en-US" dirty="0"/>
           </a:p>
@@ -1152,7 +1152,7 @@
           <a:p>
             <a:fld id="{B2497495-0637-405E-AE64-5CC7506D51F5}" type="datetime1">
               <a:rPr lang="en-US" smtClean="0"/>
-              <a:t>11/15/2021</a:t>
+              <a:t>11/16/2021</a:t>
             </a:fld>
             <a:endParaRPr lang="en-US" dirty="0"/>
           </a:p>
@@ -1417,7 +1417,7 @@
           <a:p>
             <a:fld id="{7BFFD690-9426-415D-8B65-26881E07B2D4}" type="datetime1">
               <a:rPr lang="en-US" smtClean="0"/>
-              <a:t>11/15/2021</a:t>
+              <a:t>11/16/2021</a:t>
             </a:fld>
             <a:endParaRPr lang="en-US" dirty="0"/>
           </a:p>
@@ -1829,7 +1829,7 @@
           <a:p>
             <a:fld id="{04C4989A-474C-40DE-95B9-011C28B71673}" type="datetime1">
               <a:rPr lang="en-US" smtClean="0"/>
-              <a:t>11/15/2021</a:t>
+              <a:t>11/16/2021</a:t>
             </a:fld>
             <a:endParaRPr lang="en-US" dirty="0"/>
           </a:p>
@@ -1970,7 +1970,7 @@
           <a:p>
             <a:fld id="{5DB4ED54-5B5E-4A04-93D3-5772E3CE3818}" type="datetime1">
               <a:rPr lang="en-US" smtClean="0"/>
-              <a:t>11/15/2021</a:t>
+              <a:t>11/16/2021</a:t>
             </a:fld>
             <a:endParaRPr lang="en-US" dirty="0"/>
           </a:p>
@@ -2083,7 +2083,7 @@
           <a:p>
             <a:fld id="{4EDE50D6-574B-40AF-946F-D52A04ADE379}" type="datetime1">
               <a:rPr lang="en-US" smtClean="0"/>
-              <a:t>11/15/2021</a:t>
+              <a:t>11/16/2021</a:t>
             </a:fld>
             <a:endParaRPr lang="en-US" dirty="0"/>
           </a:p>
@@ -2394,7 +2394,7 @@
           <a:p>
             <a:fld id="{D82884F1-FFEA-405F-9602-3DCA865EDA4E}" type="datetime1">
               <a:rPr lang="en-US" smtClean="0"/>
-              <a:t>11/15/2021</a:t>
+              <a:t>11/16/2021</a:t>
             </a:fld>
             <a:endParaRPr lang="en-US" dirty="0"/>
           </a:p>
@@ -2683,7 +2683,7 @@
           <a:p>
             <a:fld id="{7E18DB4A-8810-4A10-AD5C-D5E2C667F5B3}" type="datetime1">
               <a:rPr lang="en-US" smtClean="0"/>
-              <a:t>11/15/2021</a:t>
+              <a:t>11/16/2021</a:t>
             </a:fld>
             <a:endParaRPr lang="en-US" dirty="0"/>
           </a:p>
@@ -2928,7 +2928,7 @@
           <a:p>
             <a:fld id="{ED291B17-9318-49DB-B28B-6E5994AE9581}" type="datetime1">
               <a:rPr lang="en-US" smtClean="0"/>
-              <a:t>11/15/2021</a:t>
+              <a:t>11/16/2021</a:t>
             </a:fld>
             <a:endParaRPr lang="en-US" dirty="0"/>
           </a:p>
@@ -3868,7 +3868,7 @@
             </a:pPr>
             <a:r>
               <a:rPr lang="en-US" dirty="0"/>
-              <a:t>False Negatives: 216 / 7043 or 3%</a:t>
+              <a:t>False Negatives: 216 / 1761 or 12.3%</a:t>
             </a:r>
           </a:p>
           <a:p>

</xml_diff>